<commit_message>
Added a couple of displays with index page
I put in the php files to create the purchases by age and location along
with a bar chart display. If you open in index page it will have a link
to each of the displays.
</commit_message>
<xml_diff>
--- a/Advertising Positioning.pptx
+++ b/Advertising Positioning.pptx
@@ -7,9 +7,10 @@
   <p:sldIdLst>
     <p:sldId id="256" r:id="rId2"/>
     <p:sldId id="257" r:id="rId3"/>
-    <p:sldId id="258" r:id="rId4"/>
-    <p:sldId id="260" r:id="rId5"/>
-    <p:sldId id="259" r:id="rId6"/>
+    <p:sldId id="261" r:id="rId4"/>
+    <p:sldId id="258" r:id="rId5"/>
+    <p:sldId id="260" r:id="rId6"/>
+    <p:sldId id="259" r:id="rId7"/>
   </p:sldIdLst>
   <p:sldSz cx="9144000" cy="6858000" type="screen4x3"/>
   <p:notesSz cx="6858000" cy="9144000"/>
@@ -520,7 +521,7 @@
           <a:p>
             <a:fld id="{3E2977C2-D0E3-4FE4-B998-F85AA61B7915}" type="datetimeFigureOut">
               <a:rPr lang="en-US" smtClean="0"/>
-              <a:t>4/22/2013</a:t>
+              <a:t>4/27/2013</a:t>
             </a:fld>
             <a:endParaRPr lang="en-US"/>
           </a:p>
@@ -854,7 +855,7 @@
           <a:p>
             <a:fld id="{3E2977C2-D0E3-4FE4-B998-F85AA61B7915}" type="datetimeFigureOut">
               <a:rPr lang="en-US" smtClean="0"/>
-              <a:t>4/22/2013</a:t>
+              <a:t>4/27/2013</a:t>
             </a:fld>
             <a:endParaRPr lang="en-US"/>
           </a:p>
@@ -1244,7 +1245,7 @@
           <a:p>
             <a:fld id="{3E2977C2-D0E3-4FE4-B998-F85AA61B7915}" type="datetimeFigureOut">
               <a:rPr lang="en-US" smtClean="0"/>
-              <a:t>4/22/2013</a:t>
+              <a:t>4/27/2013</a:t>
             </a:fld>
             <a:endParaRPr lang="en-US"/>
           </a:p>
@@ -1680,7 +1681,7 @@
           <a:p>
             <a:fld id="{3E2977C2-D0E3-4FE4-B998-F85AA61B7915}" type="datetimeFigureOut">
               <a:rPr lang="en-US" smtClean="0"/>
-              <a:t>4/22/2013</a:t>
+              <a:t>4/27/2013</a:t>
             </a:fld>
             <a:endParaRPr lang="en-US"/>
           </a:p>
@@ -2113,7 +2114,7 @@
           <a:p>
             <a:fld id="{3E2977C2-D0E3-4FE4-B998-F85AA61B7915}" type="datetimeFigureOut">
               <a:rPr lang="en-US" smtClean="0"/>
-              <a:t>4/22/2013</a:t>
+              <a:t>4/27/2013</a:t>
             </a:fld>
             <a:endParaRPr lang="en-US"/>
           </a:p>
@@ -2597,7 +2598,7 @@
           <a:p>
             <a:fld id="{3E2977C2-D0E3-4FE4-B998-F85AA61B7915}" type="datetimeFigureOut">
               <a:rPr lang="en-US" smtClean="0"/>
-              <a:t>4/22/2013</a:t>
+              <a:t>4/27/2013</a:t>
             </a:fld>
             <a:endParaRPr lang="en-US"/>
           </a:p>
@@ -3183,7 +3184,7 @@
           <a:p>
             <a:fld id="{3E2977C2-D0E3-4FE4-B998-F85AA61B7915}" type="datetimeFigureOut">
               <a:rPr lang="en-US" smtClean="0"/>
-              <a:t>4/22/2013</a:t>
+              <a:t>4/27/2013</a:t>
             </a:fld>
             <a:endParaRPr lang="en-US"/>
           </a:p>
@@ -3511,7 +3512,7 @@
           <a:p>
             <a:fld id="{3E2977C2-D0E3-4FE4-B998-F85AA61B7915}" type="datetimeFigureOut">
               <a:rPr lang="en-US" smtClean="0"/>
-              <a:t>4/22/2013</a:t>
+              <a:t>4/27/2013</a:t>
             </a:fld>
             <a:endParaRPr lang="en-US"/>
           </a:p>
@@ -3760,7 +3761,7 @@
           <a:p>
             <a:fld id="{3E2977C2-D0E3-4FE4-B998-F85AA61B7915}" type="datetimeFigureOut">
               <a:rPr lang="en-US" smtClean="0"/>
-              <a:t>4/22/2013</a:t>
+              <a:t>4/27/2013</a:t>
             </a:fld>
             <a:endParaRPr lang="en-US"/>
           </a:p>
@@ -3924,7 +3925,6 @@
               <a:rPr lang="en-US" smtClean="0"/>
               <a:t>Click to edit Master title style</a:t>
             </a:r>
-            <a:endParaRPr lang="en-US" smtClean="0"/>
           </a:p>
         </p:txBody>
       </p:sp>
@@ -4264,7 +4264,7 @@
           <a:p>
             <a:fld id="{3E2977C2-D0E3-4FE4-B998-F85AA61B7915}" type="datetimeFigureOut">
               <a:rPr lang="en-US" smtClean="0"/>
-              <a:t>4/22/2013</a:t>
+              <a:t>4/27/2013</a:t>
             </a:fld>
             <a:endParaRPr lang="en-US"/>
           </a:p>
@@ -4715,7 +4715,7 @@
           <a:p>
             <a:fld id="{3E2977C2-D0E3-4FE4-B998-F85AA61B7915}" type="datetimeFigureOut">
               <a:rPr lang="en-US" smtClean="0"/>
-              <a:t>4/22/2013</a:t>
+              <a:t>4/27/2013</a:t>
             </a:fld>
             <a:endParaRPr lang="en-US"/>
           </a:p>
@@ -5117,7 +5117,7 @@
           <a:p>
             <a:fld id="{3E2977C2-D0E3-4FE4-B998-F85AA61B7915}" type="datetimeFigureOut">
               <a:rPr lang="en-US" smtClean="0"/>
-              <a:t>4/22/2013</a:t>
+              <a:t>4/27/2013</a:t>
             </a:fld>
             <a:endParaRPr lang="en-US"/>
           </a:p>
@@ -5788,35 +5788,68 @@
           <a:p>
             <a:r>
               <a:rPr lang="en-US" dirty="0" smtClean="0"/>
-              <a:t>Summary</a:t>
+              <a:t>Purchases by Location</a:t>
             </a:r>
             <a:endParaRPr lang="en-US" dirty="0"/>
           </a:p>
         </p:txBody>
       </p:sp>
-      <p:sp>
-        <p:nvSpPr>
-          <p:cNvPr id="3" name="Content Placeholder 2"/>
-          <p:cNvSpPr>
-            <a:spLocks noGrp="1"/>
-          </p:cNvSpPr>
-          <p:nvPr>
-            <p:ph idx="1"/>
-          </p:nvPr>
-        </p:nvSpPr>
-        <p:spPr/>
-        <p:txBody>
-          <a:bodyPr/>
-          <a:lstStyle/>
-          <a:p>
-            <a:endParaRPr lang="en-US"/>
-          </a:p>
-        </p:txBody>
-      </p:sp>
+      <p:pic>
+        <p:nvPicPr>
+          <p:cNvPr id="1026" name="Picture 2"/>
+          <p:cNvPicPr>
+            <a:picLocks noChangeAspect="1" noChangeArrowheads="1"/>
+          </p:cNvPicPr>
+          <p:nvPr/>
+        </p:nvPicPr>
+        <p:blipFill rotWithShape="1">
+          <a:blip r:embed="rId2">
+            <a:extLst>
+              <a:ext uri="{28A0092B-C50C-407E-A947-70E740481C1C}">
+                <a14:useLocalDpi xmlns:a14="http://schemas.microsoft.com/office/drawing/2010/main" val="0"/>
+              </a:ext>
+            </a:extLst>
+          </a:blip>
+          <a:srcRect t="12307" b="5055"/>
+          <a:stretch/>
+        </p:blipFill>
+        <p:spPr bwMode="auto">
+          <a:xfrm>
+            <a:off x="152400" y="2023841"/>
+            <a:ext cx="8839200" cy="3892871"/>
+          </a:xfrm>
+          <a:prstGeom prst="rect">
+            <a:avLst/>
+          </a:prstGeom>
+          <a:noFill/>
+          <a:ln>
+            <a:noFill/>
+          </a:ln>
+          <a:extLst>
+            <a:ext uri="{909E8E84-426E-40DD-AFC4-6F175D3DCCD1}">
+              <a14:hiddenFill xmlns:a14="http://schemas.microsoft.com/office/drawing/2010/main">
+                <a:solidFill>
+                  <a:schemeClr val="accent1"/>
+                </a:solidFill>
+              </a14:hiddenFill>
+            </a:ext>
+            <a:ext uri="{91240B29-F687-4F45-9708-019B960494DF}">
+              <a14:hiddenLine xmlns:a14="http://schemas.microsoft.com/office/drawing/2010/main" w="9525">
+                <a:solidFill>
+                  <a:schemeClr val="tx1"/>
+                </a:solidFill>
+                <a:miter lim="800000"/>
+                <a:headEnd/>
+                <a:tailEnd/>
+              </a14:hiddenLine>
+            </a:ext>
+          </a:extLst>
+        </p:spPr>
+      </p:pic>
     </p:spTree>
     <p:extLst>
       <p:ext uri="{BB962C8B-B14F-4D97-AF65-F5344CB8AC3E}">
-        <p14:creationId xmlns:p14="http://schemas.microsoft.com/office/powerpoint/2010/main" val="2721953889"/>
+        <p14:creationId xmlns:p14="http://schemas.microsoft.com/office/powerpoint/2010/main" val="2858113682"/>
       </p:ext>
     </p:extLst>
   </p:cSld>
@@ -5860,6 +5893,78 @@
           <a:p>
             <a:r>
               <a:rPr lang="en-US" dirty="0" smtClean="0"/>
+              <a:t>Summary</a:t>
+            </a:r>
+            <a:endParaRPr lang="en-US" dirty="0"/>
+          </a:p>
+        </p:txBody>
+      </p:sp>
+      <p:sp>
+        <p:nvSpPr>
+          <p:cNvPr id="3" name="Content Placeholder 2"/>
+          <p:cNvSpPr>
+            <a:spLocks noGrp="1"/>
+          </p:cNvSpPr>
+          <p:nvPr>
+            <p:ph idx="1"/>
+          </p:nvPr>
+        </p:nvSpPr>
+        <p:spPr/>
+        <p:txBody>
+          <a:bodyPr/>
+          <a:lstStyle/>
+          <a:p>
+            <a:endParaRPr lang="en-US"/>
+          </a:p>
+        </p:txBody>
+      </p:sp>
+    </p:spTree>
+    <p:extLst>
+      <p:ext uri="{BB962C8B-B14F-4D97-AF65-F5344CB8AC3E}">
+        <p14:creationId xmlns:p14="http://schemas.microsoft.com/office/powerpoint/2010/main" val="2721953889"/>
+      </p:ext>
+    </p:extLst>
+  </p:cSld>
+  <p:clrMapOvr>
+    <a:masterClrMapping/>
+  </p:clrMapOvr>
+</p:sld>
+</file>
+
+<file path=ppt/slides/slide5.xml><?xml version="1.0" encoding="utf-8"?>
+<p:sld xmlns:a="http://schemas.openxmlformats.org/drawingml/2006/main" xmlns:r="http://schemas.openxmlformats.org/officeDocument/2006/relationships" xmlns:p="http://schemas.openxmlformats.org/presentationml/2006/main">
+  <p:cSld>
+    <p:spTree>
+      <p:nvGrpSpPr>
+        <p:cNvPr id="1" name=""/>
+        <p:cNvGrpSpPr/>
+        <p:nvPr/>
+      </p:nvGrpSpPr>
+      <p:grpSpPr>
+        <a:xfrm>
+          <a:off x="0" y="0"/>
+          <a:ext cx="0" cy="0"/>
+          <a:chOff x="0" y="0"/>
+          <a:chExt cx="0" cy="0"/>
+        </a:xfrm>
+      </p:grpSpPr>
+      <p:sp>
+        <p:nvSpPr>
+          <p:cNvPr id="2" name="Title 1"/>
+          <p:cNvSpPr>
+            <a:spLocks noGrp="1"/>
+          </p:cNvSpPr>
+          <p:nvPr>
+            <p:ph type="title"/>
+          </p:nvPr>
+        </p:nvSpPr>
+        <p:spPr/>
+        <p:txBody>
+          <a:bodyPr/>
+          <a:lstStyle/>
+          <a:p>
+            <a:r>
+              <a:rPr lang="en-US" dirty="0" smtClean="0"/>
               <a:t>References</a:t>
             </a:r>
             <a:endParaRPr lang="en-US" dirty="0"/>
@@ -5944,7 +6049,7 @@
 </p:sld>
 </file>
 
-<file path=ppt/slides/slide5.xml><?xml version="1.0" encoding="utf-8"?>
+<file path=ppt/slides/slide6.xml><?xml version="1.0" encoding="utf-8"?>
 <p:sld xmlns:a="http://schemas.openxmlformats.org/drawingml/2006/main" xmlns:r="http://schemas.openxmlformats.org/officeDocument/2006/relationships" xmlns:p="http://schemas.openxmlformats.org/presentationml/2006/main">
   <p:cSld>
     <p:spTree>

</xml_diff>